<commit_message>
Prep for Spring 2023
</commit_message>
<xml_diff>
--- a/Administrative Spring 2023/2022 to 2023 Coding Club Advertisement.pptx
+++ b/Administrative Spring 2023/2022 to 2023 Coding Club Advertisement.pptx
@@ -3033,23 +3033,9 @@
         </p:spPr>
         <p:txBody>
           <a:bodyPr>
-            <a:normAutofit lnSpcReduction="10000"/>
+            <a:normAutofit/>
           </a:bodyPr>
           <a:lstStyle/>
-          <a:p>
-            <a:r>
-              <a:rPr lang="en-US" dirty="0">
-                <a:latin typeface="Cascadia Code" panose="020B0609020000020004" pitchFamily="49" charset="0"/>
-                <a:cs typeface="Cascadia Code" panose="020B0609020000020004" pitchFamily="49" charset="0"/>
-                <a:hlinkClick r:id="rId2"/>
-              </a:rPr>
-              <a:t>https://forms.office.com/Pages/ResponsePage.aspx?id=VGZw_NSNrUO32IhD8WGXXigPwIXu8JZHuKz_ckepTQJUMzk2NEZCQjFXR1I2MUc0RllOTk1UVjAxTS4u</a:t>
-            </a:r>
-            <a:endParaRPr lang="en-US" dirty="0">
-              <a:latin typeface="Cascadia Code" panose="020B0609020000020004" pitchFamily="49" charset="0"/>
-              <a:cs typeface="Cascadia Code" panose="020B0609020000020004" pitchFamily="49" charset="0"/>
-            </a:endParaRPr>
-          </a:p>
           <a:p>
             <a:endParaRPr lang="en-US" dirty="0">
               <a:latin typeface="Cascadia Code" panose="020B0609020000020004" pitchFamily="49" charset="0"/>
@@ -3081,7 +3067,7 @@
                 <a:latin typeface="Cascadia Code" panose="020B0609020000020004" pitchFamily="49" charset="0"/>
                 <a:cs typeface="Cascadia Code" panose="020B0609020000020004" pitchFamily="49" charset="0"/>
               </a:rPr>
-              <a:t>Meetings will be held on Thursdays at 17:00 in S&amp;E Room 303</a:t>
+              <a:t>Meetings will be held on Wednesdays at 18:30 in S&amp;E Room 303</a:t>
             </a:r>
           </a:p>
           <a:p>
@@ -3103,10 +3089,10 @@
       </p:sp>
       <p:pic>
         <p:nvPicPr>
-          <p:cNvPr id="5" name="Picture 4" descr="Qr code&#10;&#10;Description automatically generated">
+          <p:cNvPr id="6" name="Picture 5" descr="Qr code&#10;&#10;Description automatically generated">
             <a:extLst>
               <a:ext uri="{FF2B5EF4-FFF2-40B4-BE49-F238E27FC236}">
-                <a16:creationId xmlns:a16="http://schemas.microsoft.com/office/drawing/2014/main" id="{4DB171F2-4162-DF41-5338-DE8ABAFD81FB}"/>
+                <a16:creationId xmlns:a16="http://schemas.microsoft.com/office/drawing/2014/main" id="{6295589B-DEAF-BECD-2DCD-A0E429B3BE1E}"/>
               </a:ext>
             </a:extLst>
           </p:cNvPr>
@@ -3116,7 +3102,7 @@
           <p:nvPr/>
         </p:nvPicPr>
         <p:blipFill>
-          <a:blip r:embed="rId3">
+          <a:blip r:embed="rId2">
             <a:extLst>
               <a:ext uri="{28A0092B-C50C-407E-A947-70E740481C1C}">
                 <a14:useLocalDpi xmlns:a14="http://schemas.microsoft.com/office/drawing/2010/main" val="0"/>
@@ -3129,8 +3115,8 @@
         </p:blipFill>
         <p:spPr>
           <a:xfrm>
-            <a:off x="1363596" y="1129196"/>
-            <a:ext cx="5045208" cy="5045208"/>
+            <a:off x="1165091" y="1129196"/>
+            <a:ext cx="5442217" cy="5442217"/>
           </a:xfrm>
           <a:prstGeom prst="rect">
             <a:avLst/>

</xml_diff>